<commit_message>
refactoring: SelectFirst -> Select artwork
</commit_message>
<xml_diff>
--- a/artwork/logo.pptx
+++ b/artwork/logo.pptx
@@ -8,6 +8,8 @@
     <p:sldId id="256" r:id="rId2"/>
     <p:sldId id="258" r:id="rId3"/>
     <p:sldId id="259" r:id="rId4"/>
+    <p:sldId id="260" r:id="rId5"/>
+    <p:sldId id="261" r:id="rId6"/>
   </p:sldIdLst>
   <p:sldSz cx="12192000" cy="6858000"/>
   <p:notesSz cx="7099300" cy="10234613"/>
@@ -245,7 +247,7 @@
           <a:p>
             <a:fld id="{66746413-3D4E-4DB4-A6DE-DD3BCB9D872E}" type="datetimeFigureOut">
               <a:rPr lang="en-US" smtClean="0"/>
-              <a:t>2/24/2014</a:t>
+              <a:t>2/26/2014</a:t>
             </a:fld>
             <a:endParaRPr lang="en-US"/>
           </a:p>
@@ -415,7 +417,7 @@
           <a:p>
             <a:fld id="{66746413-3D4E-4DB4-A6DE-DD3BCB9D872E}" type="datetimeFigureOut">
               <a:rPr lang="en-US" smtClean="0"/>
-              <a:t>2/24/2014</a:t>
+              <a:t>2/26/2014</a:t>
             </a:fld>
             <a:endParaRPr lang="en-US"/>
           </a:p>
@@ -595,7 +597,7 @@
           <a:p>
             <a:fld id="{66746413-3D4E-4DB4-A6DE-DD3BCB9D872E}" type="datetimeFigureOut">
               <a:rPr lang="en-US" smtClean="0"/>
-              <a:t>2/24/2014</a:t>
+              <a:t>2/26/2014</a:t>
             </a:fld>
             <a:endParaRPr lang="en-US"/>
           </a:p>
@@ -765,7 +767,7 @@
           <a:p>
             <a:fld id="{66746413-3D4E-4DB4-A6DE-DD3BCB9D872E}" type="datetimeFigureOut">
               <a:rPr lang="en-US" smtClean="0"/>
-              <a:t>2/24/2014</a:t>
+              <a:t>2/26/2014</a:t>
             </a:fld>
             <a:endParaRPr lang="en-US"/>
           </a:p>
@@ -1011,7 +1013,7 @@
           <a:p>
             <a:fld id="{66746413-3D4E-4DB4-A6DE-DD3BCB9D872E}" type="datetimeFigureOut">
               <a:rPr lang="en-US" smtClean="0"/>
-              <a:t>2/24/2014</a:t>
+              <a:t>2/26/2014</a:t>
             </a:fld>
             <a:endParaRPr lang="en-US"/>
           </a:p>
@@ -1243,7 +1245,7 @@
           <a:p>
             <a:fld id="{66746413-3D4E-4DB4-A6DE-DD3BCB9D872E}" type="datetimeFigureOut">
               <a:rPr lang="en-US" smtClean="0"/>
-              <a:t>2/24/2014</a:t>
+              <a:t>2/26/2014</a:t>
             </a:fld>
             <a:endParaRPr lang="en-US"/>
           </a:p>
@@ -1610,7 +1612,7 @@
           <a:p>
             <a:fld id="{66746413-3D4E-4DB4-A6DE-DD3BCB9D872E}" type="datetimeFigureOut">
               <a:rPr lang="en-US" smtClean="0"/>
-              <a:t>2/24/2014</a:t>
+              <a:t>2/26/2014</a:t>
             </a:fld>
             <a:endParaRPr lang="en-US"/>
           </a:p>
@@ -1728,7 +1730,7 @@
           <a:p>
             <a:fld id="{66746413-3D4E-4DB4-A6DE-DD3BCB9D872E}" type="datetimeFigureOut">
               <a:rPr lang="en-US" smtClean="0"/>
-              <a:t>2/24/2014</a:t>
+              <a:t>2/26/2014</a:t>
             </a:fld>
             <a:endParaRPr lang="en-US"/>
           </a:p>
@@ -1823,7 +1825,7 @@
           <a:p>
             <a:fld id="{66746413-3D4E-4DB4-A6DE-DD3BCB9D872E}" type="datetimeFigureOut">
               <a:rPr lang="en-US" smtClean="0"/>
-              <a:t>2/24/2014</a:t>
+              <a:t>2/26/2014</a:t>
             </a:fld>
             <a:endParaRPr lang="en-US"/>
           </a:p>
@@ -2100,7 +2102,7 @@
           <a:p>
             <a:fld id="{66746413-3D4E-4DB4-A6DE-DD3BCB9D872E}" type="datetimeFigureOut">
               <a:rPr lang="en-US" smtClean="0"/>
-              <a:t>2/24/2014</a:t>
+              <a:t>2/26/2014</a:t>
             </a:fld>
             <a:endParaRPr lang="en-US"/>
           </a:p>
@@ -2353,7 +2355,7 @@
           <a:p>
             <a:fld id="{66746413-3D4E-4DB4-A6DE-DD3BCB9D872E}" type="datetimeFigureOut">
               <a:rPr lang="en-US" smtClean="0"/>
-              <a:t>2/24/2014</a:t>
+              <a:t>2/26/2014</a:t>
             </a:fld>
             <a:endParaRPr lang="en-US"/>
           </a:p>
@@ -2566,7 +2568,7 @@
           <a:p>
             <a:fld id="{66746413-3D4E-4DB4-A6DE-DD3BCB9D872E}" type="datetimeFigureOut">
               <a:rPr lang="en-US" smtClean="0"/>
-              <a:t>2/24/2014</a:t>
+              <a:t>2/26/2014</a:t>
             </a:fld>
             <a:endParaRPr lang="en-US"/>
           </a:p>
@@ -3596,33 +3598,7 @@
                   </a:outerShdw>
                 </a:effectLst>
               </a:rPr>
-              <a:t>Simulation and Analysis of </a:t>
-            </a:r>
-            <a:r>
-              <a:rPr lang="de-DE" sz="2000" smtClean="0">
-                <a:ln w="0"/>
-                <a:effectLst>
-                  <a:outerShdw blurRad="38100" dist="19050" dir="2700000" algn="tl" rotWithShape="0">
-                    <a:schemeClr val="dk1">
-                      <a:alpha val="40000"/>
-                    </a:schemeClr>
-                  </a:outerShdw>
-                </a:effectLst>
-              </a:rPr>
-              <a:t>Logic-Based </a:t>
-            </a:r>
-            <a:r>
-              <a:rPr lang="de-DE" sz="2000" smtClean="0">
-                <a:ln w="0"/>
-                <a:effectLst>
-                  <a:outerShdw blurRad="38100" dist="19050" dir="2700000" algn="tl" rotWithShape="0">
-                    <a:schemeClr val="dk1">
-                      <a:alpha val="40000"/>
-                    </a:schemeClr>
-                  </a:outerShdw>
-                </a:effectLst>
-              </a:rPr>
-              <a:t>Multi-Agent System Models</a:t>
+              <a:t>Simulation and Analysis of Logic-Based Multi-Agent System Models</a:t>
             </a:r>
             <a:endParaRPr lang="de-DE" sz="2000">
               <a:ln w="0"/>
@@ -4211,33 +4187,7 @@
                   </a:outerShdw>
                 </a:effectLst>
               </a:rPr>
-              <a:t>Simulation and Analysis of </a:t>
-            </a:r>
-            <a:r>
-              <a:rPr lang="de-DE" sz="2000" smtClean="0">
-                <a:ln w="0"/>
-                <a:effectLst>
-                  <a:outerShdw blurRad="38100" dist="19050" dir="2700000" algn="tl" rotWithShape="0">
-                    <a:schemeClr val="dk1">
-                      <a:alpha val="40000"/>
-                    </a:schemeClr>
-                  </a:outerShdw>
-                </a:effectLst>
-              </a:rPr>
-              <a:t>Logic-Based </a:t>
-            </a:r>
-            <a:r>
-              <a:rPr lang="de-DE" sz="2000" smtClean="0">
-                <a:ln w="0"/>
-                <a:effectLst>
-                  <a:outerShdw blurRad="38100" dist="19050" dir="2700000" algn="tl" rotWithShape="0">
-                    <a:schemeClr val="dk1">
-                      <a:alpha val="40000"/>
-                    </a:schemeClr>
-                  </a:outerShdw>
-                </a:effectLst>
-              </a:rPr>
-              <a:t>Multi-Agent System Models</a:t>
+              <a:t>Simulation and Analysis of Logic-Based Multi-Agent System Models</a:t>
             </a:r>
             <a:endParaRPr lang="de-DE" sz="2000">
               <a:ln w="0"/>
@@ -4701,8 +4651,8 @@
           </a:p>
         </p:txBody>
       </p:sp>
-      <mc:AlternateContent xmlns:mc="http://schemas.openxmlformats.org/markup-compatibility/2006">
-        <mc:Choice xmlns:a14="http://schemas.microsoft.com/office/drawing/2010/main" Requires="a14">
+      <mc:AlternateContent xmlns:mc="http://schemas.openxmlformats.org/markup-compatibility/2006" xmlns:a14="http://schemas.microsoft.com/office/drawing/2010/main">
+        <mc:Choice Requires="a14">
           <p:sp>
             <p:nvSpPr>
               <p:cNvPr id="15" name="Textfeld 14"/>
@@ -4725,6 +4675,7 @@
               </a:bodyPr>
               <a:lstStyle/>
               <a:p>
+                <a:pPr/>
                 <a14:m>
                   <m:oMathPara xmlns:m="http://schemas.openxmlformats.org/officeDocument/2006/math">
                     <m:oMathParaPr>
@@ -4753,7 +4704,7 @@
             </p:txBody>
           </p:sp>
         </mc:Choice>
-        <mc:Fallback>
+        <mc:Fallback xmlns="">
           <p:sp>
             <p:nvSpPr>
               <p:cNvPr id="15" name="Textfeld 14"/>
@@ -4796,6 +4747,1379 @@
     <p:extLst>
       <p:ext uri="{BB962C8B-B14F-4D97-AF65-F5344CB8AC3E}">
         <p14:creationId xmlns:p14="http://schemas.microsoft.com/office/powerpoint/2010/main" val="1641220020"/>
+      </p:ext>
+    </p:extLst>
+  </p:cSld>
+  <p:clrMapOvr>
+    <a:masterClrMapping/>
+  </p:clrMapOvr>
+  <p:timing>
+    <p:tnLst>
+      <p:par>
+        <p:cTn id="1" dur="indefinite" restart="never" nodeType="tmRoot"/>
+      </p:par>
+    </p:tnLst>
+  </p:timing>
+</p:sld>
+</file>
+
+<file path=ppt/slides/slide4.xml><?xml version="1.0" encoding="utf-8"?>
+<p:sld xmlns:a="http://schemas.openxmlformats.org/drawingml/2006/main" xmlns:r="http://schemas.openxmlformats.org/officeDocument/2006/relationships" xmlns:p="http://schemas.openxmlformats.org/presentationml/2006/main">
+  <p:cSld>
+    <p:spTree>
+      <p:nvGrpSpPr>
+        <p:cNvPr id="1" name=""/>
+        <p:cNvGrpSpPr/>
+        <p:nvPr/>
+      </p:nvGrpSpPr>
+      <p:grpSpPr>
+        <a:xfrm>
+          <a:off x="0" y="0"/>
+          <a:ext cx="0" cy="0"/>
+          <a:chOff x="0" y="0"/>
+          <a:chExt cx="0" cy="0"/>
+        </a:xfrm>
+      </p:grpSpPr>
+      <p:sp>
+        <p:nvSpPr>
+          <p:cNvPr id="4" name="Rechteck 3"/>
+          <p:cNvSpPr/>
+          <p:nvPr/>
+        </p:nvSpPr>
+        <p:spPr>
+          <a:xfrm>
+            <a:off x="1055389" y="527934"/>
+            <a:ext cx="3302507" cy="1200329"/>
+          </a:xfrm>
+          <a:prstGeom prst="rect">
+            <a:avLst/>
+          </a:prstGeom>
+          <a:noFill/>
+        </p:spPr>
+        <p:txBody>
+          <a:bodyPr wrap="none" lIns="91440" tIns="45720" rIns="91440" bIns="45720">
+            <a:spAutoFit/>
+          </a:bodyPr>
+          <a:lstStyle/>
+          <a:p>
+            <a:pPr algn="ctr"/>
+            <a:r>
+              <a:rPr lang="de-DE" sz="7200" b="1" i="1" smtClean="0">
+                <a:ln w="28575" cap="rnd" cmpd="sng">
+                  <a:solidFill>
+                    <a:srgbClr val="0066CC"/>
+                  </a:solidFill>
+                  <a:prstDash val="solid"/>
+                </a:ln>
+                <a:solidFill>
+                  <a:schemeClr val="bg1"/>
+                </a:solidFill>
+                <a:latin typeface="Aharoni" panose="02010803020104030203" pitchFamily="2" charset="-79"/>
+                <a:cs typeface="Aharoni" panose="02010803020104030203" pitchFamily="2" charset="-79"/>
+              </a:rPr>
+              <a:t>SALMA</a:t>
+            </a:r>
+            <a:endParaRPr lang="de-DE" sz="7200" b="1" i="1">
+              <a:ln w="28575" cap="rnd" cmpd="sng">
+                <a:solidFill>
+                  <a:srgbClr val="0066CC"/>
+                </a:solidFill>
+                <a:prstDash val="solid"/>
+              </a:ln>
+              <a:solidFill>
+                <a:schemeClr val="bg1"/>
+              </a:solidFill>
+              <a:latin typeface="Aharoni" panose="02010803020104030203" pitchFamily="2" charset="-79"/>
+              <a:cs typeface="Aharoni" panose="02010803020104030203" pitchFamily="2" charset="-79"/>
+            </a:endParaRPr>
+          </a:p>
+        </p:txBody>
+      </p:sp>
+      <p:sp>
+        <p:nvSpPr>
+          <p:cNvPr id="5" name="Rechteck 4"/>
+          <p:cNvSpPr/>
+          <p:nvPr/>
+        </p:nvSpPr>
+        <p:spPr>
+          <a:xfrm>
+            <a:off x="4753953" y="692119"/>
+            <a:ext cx="2408993" cy="830997"/>
+          </a:xfrm>
+          <a:prstGeom prst="rect">
+            <a:avLst/>
+          </a:prstGeom>
+          <a:noFill/>
+        </p:spPr>
+        <p:txBody>
+          <a:bodyPr wrap="none" lIns="91440" tIns="45720" rIns="91440" bIns="45720">
+            <a:spAutoFit/>
+          </a:bodyPr>
+          <a:lstStyle/>
+          <a:p>
+            <a:r>
+              <a:rPr lang="de-DE" sz="1600" dirty="0" smtClean="0">
+                <a:ln w="0"/>
+              </a:rPr>
+              <a:t>Simulation </a:t>
+            </a:r>
+            <a:r>
+              <a:rPr lang="de-DE" sz="1600" dirty="0" err="1" smtClean="0">
+                <a:ln w="0"/>
+              </a:rPr>
+              <a:t>and</a:t>
+            </a:r>
+            <a:r>
+              <a:rPr lang="de-DE" sz="1600" dirty="0" smtClean="0">
+                <a:ln w="0"/>
+              </a:rPr>
+              <a:t> Analysis </a:t>
+            </a:r>
+            <a:r>
+              <a:rPr lang="de-DE" sz="1600" dirty="0" err="1" smtClean="0">
+                <a:ln w="0"/>
+              </a:rPr>
+              <a:t>of</a:t>
+            </a:r>
+            <a:r>
+              <a:rPr lang="de-DE" sz="1600" dirty="0" smtClean="0">
+                <a:ln w="0"/>
+              </a:rPr>
+              <a:t> </a:t>
+            </a:r>
+            <a:endParaRPr lang="de-DE" sz="1600" dirty="0" smtClean="0">
+              <a:ln w="0"/>
+            </a:endParaRPr>
+          </a:p>
+          <a:p>
+            <a:r>
+              <a:rPr lang="de-DE" sz="1600" dirty="0" err="1" smtClean="0">
+                <a:ln w="0"/>
+              </a:rPr>
+              <a:t>Logic-Based</a:t>
+            </a:r>
+            <a:r>
+              <a:rPr lang="de-DE" sz="1600" dirty="0" smtClean="0">
+                <a:ln w="0"/>
+              </a:rPr>
+              <a:t> Multi-Agent </a:t>
+            </a:r>
+            <a:br>
+              <a:rPr lang="de-DE" sz="1600" dirty="0" smtClean="0">
+                <a:ln w="0"/>
+              </a:rPr>
+            </a:br>
+            <a:r>
+              <a:rPr lang="de-DE" sz="1600" dirty="0" smtClean="0">
+                <a:ln w="0"/>
+              </a:rPr>
+              <a:t>System </a:t>
+            </a:r>
+            <a:r>
+              <a:rPr lang="de-DE" sz="1600" dirty="0" smtClean="0">
+                <a:ln w="0"/>
+              </a:rPr>
+              <a:t>Models</a:t>
+            </a:r>
+            <a:endParaRPr lang="de-DE" sz="1600" dirty="0">
+              <a:ln w="0"/>
+            </a:endParaRPr>
+          </a:p>
+        </p:txBody>
+      </p:sp>
+      <p:sp>
+        <p:nvSpPr>
+          <p:cNvPr id="9" name="Rechteck 8"/>
+          <p:cNvSpPr/>
+          <p:nvPr/>
+        </p:nvSpPr>
+        <p:spPr>
+          <a:xfrm>
+            <a:off x="969114" y="918708"/>
+            <a:ext cx="28800" cy="520639"/>
+          </a:xfrm>
+          <a:prstGeom prst="rect">
+            <a:avLst/>
+          </a:prstGeom>
+          <a:solidFill>
+            <a:srgbClr val="0066CC"/>
+          </a:solidFill>
+          <a:ln>
+            <a:noFill/>
+          </a:ln>
+        </p:spPr>
+        <p:style>
+          <a:lnRef idx="2">
+            <a:schemeClr val="accent1">
+              <a:shade val="50000"/>
+            </a:schemeClr>
+          </a:lnRef>
+          <a:fillRef idx="1">
+            <a:schemeClr val="accent1"/>
+          </a:fillRef>
+          <a:effectRef idx="0">
+            <a:schemeClr val="accent1"/>
+          </a:effectRef>
+          <a:fontRef idx="minor">
+            <a:schemeClr val="lt1"/>
+          </a:fontRef>
+        </p:style>
+        <p:txBody>
+          <a:bodyPr rtlCol="0" anchor="ctr"/>
+          <a:lstStyle/>
+          <a:p>
+            <a:pPr algn="ctr"/>
+            <a:endParaRPr lang="en-US"/>
+          </a:p>
+        </p:txBody>
+      </p:sp>
+      <p:sp>
+        <p:nvSpPr>
+          <p:cNvPr id="11" name="Rechteck 10"/>
+          <p:cNvSpPr/>
+          <p:nvPr/>
+        </p:nvSpPr>
+        <p:spPr>
+          <a:xfrm>
+            <a:off x="1076484" y="1135641"/>
+            <a:ext cx="28800" cy="303706"/>
+          </a:xfrm>
+          <a:prstGeom prst="rect">
+            <a:avLst/>
+          </a:prstGeom>
+          <a:solidFill>
+            <a:srgbClr val="0066CC"/>
+          </a:solidFill>
+          <a:ln>
+            <a:noFill/>
+          </a:ln>
+        </p:spPr>
+        <p:style>
+          <a:lnRef idx="2">
+            <a:schemeClr val="accent1">
+              <a:shade val="50000"/>
+            </a:schemeClr>
+          </a:lnRef>
+          <a:fillRef idx="1">
+            <a:schemeClr val="accent1"/>
+          </a:fillRef>
+          <a:effectRef idx="0">
+            <a:schemeClr val="accent1"/>
+          </a:effectRef>
+          <a:fontRef idx="minor">
+            <a:schemeClr val="lt1"/>
+          </a:fontRef>
+        </p:style>
+        <p:txBody>
+          <a:bodyPr rtlCol="0" anchor="ctr"/>
+          <a:lstStyle/>
+          <a:p>
+            <a:pPr algn="ctr"/>
+            <a:endParaRPr lang="en-US"/>
+          </a:p>
+        </p:txBody>
+      </p:sp>
+      <p:sp>
+        <p:nvSpPr>
+          <p:cNvPr id="12" name="Rechteck 11"/>
+          <p:cNvSpPr/>
+          <p:nvPr/>
+        </p:nvSpPr>
+        <p:spPr>
+          <a:xfrm>
+            <a:off x="861738" y="1115347"/>
+            <a:ext cx="28800" cy="324000"/>
+          </a:xfrm>
+          <a:prstGeom prst="rect">
+            <a:avLst/>
+          </a:prstGeom>
+          <a:solidFill>
+            <a:srgbClr val="0066CC"/>
+          </a:solidFill>
+          <a:ln>
+            <a:noFill/>
+          </a:ln>
+        </p:spPr>
+        <p:style>
+          <a:lnRef idx="2">
+            <a:schemeClr val="accent1">
+              <a:shade val="50000"/>
+            </a:schemeClr>
+          </a:lnRef>
+          <a:fillRef idx="1">
+            <a:schemeClr val="accent1"/>
+          </a:fillRef>
+          <a:effectRef idx="0">
+            <a:schemeClr val="accent1"/>
+          </a:effectRef>
+          <a:fontRef idx="minor">
+            <a:schemeClr val="lt1"/>
+          </a:fontRef>
+        </p:style>
+        <p:txBody>
+          <a:bodyPr rtlCol="0" anchor="ctr"/>
+          <a:lstStyle/>
+          <a:p>
+            <a:pPr algn="ctr"/>
+            <a:endParaRPr lang="en-US"/>
+          </a:p>
+        </p:txBody>
+      </p:sp>
+      <p:sp>
+        <p:nvSpPr>
+          <p:cNvPr id="13" name="Rechteck 12"/>
+          <p:cNvSpPr/>
+          <p:nvPr/>
+        </p:nvSpPr>
+        <p:spPr>
+          <a:xfrm>
+            <a:off x="914236" y="1005481"/>
+            <a:ext cx="28800" cy="433866"/>
+          </a:xfrm>
+          <a:prstGeom prst="rect">
+            <a:avLst/>
+          </a:prstGeom>
+          <a:solidFill>
+            <a:srgbClr val="0066CC"/>
+          </a:solidFill>
+          <a:ln>
+            <a:noFill/>
+          </a:ln>
+        </p:spPr>
+        <p:style>
+          <a:lnRef idx="2">
+            <a:schemeClr val="accent1">
+              <a:shade val="50000"/>
+            </a:schemeClr>
+          </a:lnRef>
+          <a:fillRef idx="1">
+            <a:schemeClr val="accent1"/>
+          </a:fillRef>
+          <a:effectRef idx="0">
+            <a:schemeClr val="accent1"/>
+          </a:effectRef>
+          <a:fontRef idx="minor">
+            <a:schemeClr val="lt1"/>
+          </a:fontRef>
+        </p:style>
+        <p:txBody>
+          <a:bodyPr rtlCol="0" anchor="ctr"/>
+          <a:lstStyle/>
+          <a:p>
+            <a:pPr algn="ctr"/>
+            <a:endParaRPr lang="en-US"/>
+          </a:p>
+        </p:txBody>
+      </p:sp>
+      <p:sp>
+        <p:nvSpPr>
+          <p:cNvPr id="14" name="Rechteck 13"/>
+          <p:cNvSpPr/>
+          <p:nvPr/>
+        </p:nvSpPr>
+        <p:spPr>
+          <a:xfrm>
+            <a:off x="1021606" y="1048868"/>
+            <a:ext cx="28800" cy="390479"/>
+          </a:xfrm>
+          <a:prstGeom prst="rect">
+            <a:avLst/>
+          </a:prstGeom>
+          <a:solidFill>
+            <a:srgbClr val="0066CC"/>
+          </a:solidFill>
+          <a:ln>
+            <a:noFill/>
+          </a:ln>
+        </p:spPr>
+        <p:style>
+          <a:lnRef idx="2">
+            <a:schemeClr val="accent1">
+              <a:shade val="50000"/>
+            </a:schemeClr>
+          </a:lnRef>
+          <a:fillRef idx="1">
+            <a:schemeClr val="accent1"/>
+          </a:fillRef>
+          <a:effectRef idx="0">
+            <a:schemeClr val="accent1"/>
+          </a:effectRef>
+          <a:fontRef idx="minor">
+            <a:schemeClr val="lt1"/>
+          </a:fontRef>
+        </p:style>
+        <p:txBody>
+          <a:bodyPr rtlCol="0" anchor="ctr"/>
+          <a:lstStyle/>
+          <a:p>
+            <a:pPr algn="ctr"/>
+            <a:endParaRPr lang="en-US"/>
+          </a:p>
+        </p:txBody>
+      </p:sp>
+      <p:sp>
+        <p:nvSpPr>
+          <p:cNvPr id="21" name="Rechteck 20"/>
+          <p:cNvSpPr/>
+          <p:nvPr/>
+        </p:nvSpPr>
+        <p:spPr>
+          <a:xfrm>
+            <a:off x="1131363" y="1259347"/>
+            <a:ext cx="28800" cy="180000"/>
+          </a:xfrm>
+          <a:prstGeom prst="rect">
+            <a:avLst/>
+          </a:prstGeom>
+          <a:solidFill>
+            <a:srgbClr val="0066CC"/>
+          </a:solidFill>
+          <a:ln>
+            <a:noFill/>
+          </a:ln>
+        </p:spPr>
+        <p:style>
+          <a:lnRef idx="2">
+            <a:schemeClr val="accent1">
+              <a:shade val="50000"/>
+            </a:schemeClr>
+          </a:lnRef>
+          <a:fillRef idx="1">
+            <a:schemeClr val="accent1"/>
+          </a:fillRef>
+          <a:effectRef idx="0">
+            <a:schemeClr val="accent1"/>
+          </a:effectRef>
+          <a:fontRef idx="minor">
+            <a:schemeClr val="lt1"/>
+          </a:fontRef>
+        </p:style>
+        <p:txBody>
+          <a:bodyPr rtlCol="0" anchor="ctr"/>
+          <a:lstStyle/>
+          <a:p>
+            <a:pPr algn="ctr"/>
+            <a:endParaRPr lang="en-US"/>
+          </a:p>
+        </p:txBody>
+      </p:sp>
+      <p:sp>
+        <p:nvSpPr>
+          <p:cNvPr id="25" name="Rechteck 24"/>
+          <p:cNvSpPr/>
+          <p:nvPr/>
+        </p:nvSpPr>
+        <p:spPr>
+          <a:xfrm>
+            <a:off x="809115" y="1295347"/>
+            <a:ext cx="28800" cy="144000"/>
+          </a:xfrm>
+          <a:prstGeom prst="rect">
+            <a:avLst/>
+          </a:prstGeom>
+          <a:solidFill>
+            <a:srgbClr val="0066CC"/>
+          </a:solidFill>
+          <a:ln>
+            <a:noFill/>
+          </a:ln>
+        </p:spPr>
+        <p:style>
+          <a:lnRef idx="2">
+            <a:schemeClr val="accent1">
+              <a:shade val="50000"/>
+            </a:schemeClr>
+          </a:lnRef>
+          <a:fillRef idx="1">
+            <a:schemeClr val="accent1"/>
+          </a:fillRef>
+          <a:effectRef idx="0">
+            <a:schemeClr val="accent1"/>
+          </a:effectRef>
+          <a:fontRef idx="minor">
+            <a:schemeClr val="lt1"/>
+          </a:fontRef>
+        </p:style>
+        <p:txBody>
+          <a:bodyPr rtlCol="0" anchor="ctr"/>
+          <a:lstStyle/>
+          <a:p>
+            <a:pPr algn="ctr"/>
+            <a:endParaRPr lang="en-US"/>
+          </a:p>
+        </p:txBody>
+      </p:sp>
+      <p:cxnSp>
+        <p:nvCxnSpPr>
+          <p:cNvPr id="7" name="Gerader Verbinder 6"/>
+          <p:cNvCxnSpPr/>
+          <p:nvPr/>
+        </p:nvCxnSpPr>
+        <p:spPr>
+          <a:xfrm>
+            <a:off x="775774" y="1485900"/>
+            <a:ext cx="6387172" cy="0"/>
+          </a:xfrm>
+          <a:prstGeom prst="line">
+            <a:avLst/>
+          </a:prstGeom>
+          <a:ln w="22225">
+            <a:solidFill>
+              <a:srgbClr val="0066CC"/>
+            </a:solidFill>
+          </a:ln>
+        </p:spPr>
+        <p:style>
+          <a:lnRef idx="1">
+            <a:schemeClr val="accent1"/>
+          </a:lnRef>
+          <a:fillRef idx="0">
+            <a:schemeClr val="accent1"/>
+          </a:fillRef>
+          <a:effectRef idx="0">
+            <a:schemeClr val="accent1"/>
+          </a:effectRef>
+          <a:fontRef idx="minor">
+            <a:schemeClr val="tx1"/>
+          </a:fontRef>
+        </p:style>
+      </p:cxnSp>
+      <p:sp>
+        <p:nvSpPr>
+          <p:cNvPr id="22" name="Rechteck 21"/>
+          <p:cNvSpPr/>
+          <p:nvPr/>
+        </p:nvSpPr>
+        <p:spPr>
+          <a:xfrm>
+            <a:off x="1186242" y="1367347"/>
+            <a:ext cx="28800" cy="72000"/>
+          </a:xfrm>
+          <a:prstGeom prst="rect">
+            <a:avLst/>
+          </a:prstGeom>
+          <a:solidFill>
+            <a:srgbClr val="0066CC"/>
+          </a:solidFill>
+          <a:ln>
+            <a:noFill/>
+          </a:ln>
+        </p:spPr>
+        <p:style>
+          <a:lnRef idx="2">
+            <a:schemeClr val="accent1">
+              <a:shade val="50000"/>
+            </a:schemeClr>
+          </a:lnRef>
+          <a:fillRef idx="1">
+            <a:schemeClr val="accent1"/>
+          </a:fillRef>
+          <a:effectRef idx="0">
+            <a:schemeClr val="accent1"/>
+          </a:effectRef>
+          <a:fontRef idx="minor">
+            <a:schemeClr val="lt1"/>
+          </a:fontRef>
+        </p:style>
+        <p:txBody>
+          <a:bodyPr rtlCol="0" anchor="ctr"/>
+          <a:lstStyle/>
+          <a:p>
+            <a:pPr algn="ctr"/>
+            <a:endParaRPr lang="en-US"/>
+          </a:p>
+        </p:txBody>
+      </p:sp>
+      <p:sp>
+        <p:nvSpPr>
+          <p:cNvPr id="23" name="Rechteck 22"/>
+          <p:cNvSpPr/>
+          <p:nvPr/>
+        </p:nvSpPr>
+        <p:spPr>
+          <a:xfrm>
+            <a:off x="1241121" y="1402158"/>
+            <a:ext cx="28800" cy="36000"/>
+          </a:xfrm>
+          <a:prstGeom prst="rect">
+            <a:avLst/>
+          </a:prstGeom>
+          <a:solidFill>
+            <a:srgbClr val="0066CC"/>
+          </a:solidFill>
+          <a:ln>
+            <a:noFill/>
+          </a:ln>
+        </p:spPr>
+        <p:style>
+          <a:lnRef idx="2">
+            <a:schemeClr val="accent1">
+              <a:shade val="50000"/>
+            </a:schemeClr>
+          </a:lnRef>
+          <a:fillRef idx="1">
+            <a:schemeClr val="accent1"/>
+          </a:fillRef>
+          <a:effectRef idx="0">
+            <a:schemeClr val="accent1"/>
+          </a:effectRef>
+          <a:fontRef idx="minor">
+            <a:schemeClr val="lt1"/>
+          </a:fontRef>
+        </p:style>
+        <p:txBody>
+          <a:bodyPr rtlCol="0" anchor="ctr"/>
+          <a:lstStyle/>
+          <a:p>
+            <a:pPr algn="ctr"/>
+            <a:endParaRPr lang="en-US"/>
+          </a:p>
+        </p:txBody>
+      </p:sp>
+      <mc:AlternateContent xmlns:mc="http://schemas.openxmlformats.org/markup-compatibility/2006" xmlns:a14="http://schemas.microsoft.com/office/drawing/2010/main">
+        <mc:Choice Requires="a14">
+          <p:sp>
+            <p:nvSpPr>
+              <p:cNvPr id="15" name="Textfeld 14"/>
+              <p:cNvSpPr txBox="1"/>
+              <p:nvPr/>
+            </p:nvSpPr>
+            <p:spPr>
+              <a:xfrm>
+                <a:off x="4245452" y="617981"/>
+                <a:ext cx="339837" cy="430887"/>
+              </a:xfrm>
+              <a:prstGeom prst="rect">
+                <a:avLst/>
+              </a:prstGeom>
+              <a:noFill/>
+            </p:spPr>
+            <p:txBody>
+              <a:bodyPr wrap="none" lIns="0" tIns="0" rIns="0" bIns="0" rtlCol="0">
+                <a:spAutoFit/>
+              </a:bodyPr>
+              <a:lstStyle/>
+              <a:p>
+                <a:pPr/>
+                <a14:m>
+                  <m:oMathPara xmlns:m="http://schemas.openxmlformats.org/officeDocument/2006/math">
+                    <m:oMathParaPr>
+                      <m:jc m:val="centerGroup"/>
+                    </m:oMathParaPr>
+                    <m:oMath xmlns:m="http://schemas.openxmlformats.org/officeDocument/2006/math">
+                      <m:r>
+                        <a:rPr lang="en-US" sz="2800" i="1" smtClean="0">
+                          <a:solidFill>
+                            <a:srgbClr val="0066CC"/>
+                          </a:solidFill>
+                          <a:latin typeface="Cambria Math" panose="02040503050406030204" pitchFamily="18" charset="0"/>
+                          <a:ea typeface="Cambria Math" panose="02040503050406030204" pitchFamily="18" charset="0"/>
+                        </a:rPr>
+                        <m:t>⊨</m:t>
+                      </m:r>
+                    </m:oMath>
+                  </m:oMathPara>
+                </a14:m>
+                <a:endParaRPr lang="en-US" sz="2800">
+                  <a:solidFill>
+                    <a:srgbClr val="0066CC"/>
+                  </a:solidFill>
+                </a:endParaRPr>
+              </a:p>
+            </p:txBody>
+          </p:sp>
+        </mc:Choice>
+        <mc:Fallback xmlns="">
+          <p:sp>
+            <p:nvSpPr>
+              <p:cNvPr id="15" name="Textfeld 14"/>
+              <p:cNvSpPr txBox="1">
+                <a:spLocks noRot="1" noChangeAspect="1" noMove="1" noResize="1" noEditPoints="1" noAdjustHandles="1" noChangeArrowheads="1" noChangeShapeType="1" noTextEdit="1"/>
+              </p:cNvSpPr>
+              <p:nvPr/>
+            </p:nvSpPr>
+            <p:spPr>
+              <a:xfrm>
+                <a:off x="4245452" y="617981"/>
+                <a:ext cx="339837" cy="430887"/>
+              </a:xfrm>
+              <a:prstGeom prst="rect">
+                <a:avLst/>
+              </a:prstGeom>
+              <a:blipFill rotWithShape="0">
+                <a:blip r:embed="rId2"/>
+                <a:stretch>
+                  <a:fillRect/>
+                </a:stretch>
+              </a:blipFill>
+            </p:spPr>
+            <p:txBody>
+              <a:bodyPr/>
+              <a:lstStyle/>
+              <a:p>
+                <a:r>
+                  <a:rPr lang="en-US">
+                    <a:noFill/>
+                  </a:rPr>
+                  <a:t> </a:t>
+                </a:r>
+              </a:p>
+            </p:txBody>
+          </p:sp>
+        </mc:Fallback>
+      </mc:AlternateContent>
+    </p:spTree>
+    <p:extLst>
+      <p:ext uri="{BB962C8B-B14F-4D97-AF65-F5344CB8AC3E}">
+        <p14:creationId xmlns:p14="http://schemas.microsoft.com/office/powerpoint/2010/main" val="2333790993"/>
+      </p:ext>
+    </p:extLst>
+  </p:cSld>
+  <p:clrMapOvr>
+    <a:masterClrMapping/>
+  </p:clrMapOvr>
+  <p:timing>
+    <p:tnLst>
+      <p:par>
+        <p:cTn id="1" dur="indefinite" restart="never" nodeType="tmRoot"/>
+      </p:par>
+    </p:tnLst>
+  </p:timing>
+</p:sld>
+</file>
+
+<file path=ppt/slides/slide5.xml><?xml version="1.0" encoding="utf-8"?>
+<p:sld xmlns:a="http://schemas.openxmlformats.org/drawingml/2006/main" xmlns:r="http://schemas.openxmlformats.org/officeDocument/2006/relationships" xmlns:p="http://schemas.openxmlformats.org/presentationml/2006/main">
+  <p:cSld>
+    <p:spTree>
+      <p:nvGrpSpPr>
+        <p:cNvPr id="1" name=""/>
+        <p:cNvGrpSpPr/>
+        <p:nvPr/>
+      </p:nvGrpSpPr>
+      <p:grpSpPr>
+        <a:xfrm>
+          <a:off x="0" y="0"/>
+          <a:ext cx="0" cy="0"/>
+          <a:chOff x="0" y="0"/>
+          <a:chExt cx="0" cy="0"/>
+        </a:xfrm>
+      </p:grpSpPr>
+      <p:grpSp>
+        <p:nvGrpSpPr>
+          <p:cNvPr id="8" name="Gruppieren 7"/>
+          <p:cNvGrpSpPr/>
+          <p:nvPr/>
+        </p:nvGrpSpPr>
+        <p:grpSpPr>
+          <a:xfrm>
+            <a:off x="775774" y="527934"/>
+            <a:ext cx="3809515" cy="1200329"/>
+            <a:chOff x="775774" y="527934"/>
+            <a:chExt cx="3809515" cy="1200329"/>
+          </a:xfrm>
+        </p:grpSpPr>
+        <p:sp>
+          <p:nvSpPr>
+            <p:cNvPr id="4" name="Rechteck 3"/>
+            <p:cNvSpPr/>
+            <p:nvPr/>
+          </p:nvSpPr>
+          <p:spPr>
+            <a:xfrm>
+              <a:off x="1055389" y="527934"/>
+              <a:ext cx="3302507" cy="1200329"/>
+            </a:xfrm>
+            <a:prstGeom prst="rect">
+              <a:avLst/>
+            </a:prstGeom>
+            <a:noFill/>
+          </p:spPr>
+          <p:txBody>
+            <a:bodyPr wrap="none" lIns="91440" tIns="45720" rIns="91440" bIns="45720">
+              <a:spAutoFit/>
+            </a:bodyPr>
+            <a:lstStyle/>
+            <a:p>
+              <a:pPr algn="ctr"/>
+              <a:r>
+                <a:rPr lang="de-DE" sz="7200" b="1" i="1" smtClean="0">
+                  <a:ln w="28575" cap="rnd" cmpd="sng">
+                    <a:solidFill>
+                      <a:srgbClr val="0066CC"/>
+                    </a:solidFill>
+                    <a:prstDash val="solid"/>
+                  </a:ln>
+                  <a:solidFill>
+                    <a:schemeClr val="bg1"/>
+                  </a:solidFill>
+                  <a:latin typeface="Aharoni" panose="02010803020104030203" pitchFamily="2" charset="-79"/>
+                  <a:cs typeface="Aharoni" panose="02010803020104030203" pitchFamily="2" charset="-79"/>
+                </a:rPr>
+                <a:t>SALMA</a:t>
+              </a:r>
+              <a:endParaRPr lang="de-DE" sz="7200" b="1" i="1">
+                <a:ln w="28575" cap="rnd" cmpd="sng">
+                  <a:solidFill>
+                    <a:srgbClr val="0066CC"/>
+                  </a:solidFill>
+                  <a:prstDash val="solid"/>
+                </a:ln>
+                <a:solidFill>
+                  <a:schemeClr val="bg1"/>
+                </a:solidFill>
+                <a:latin typeface="Aharoni" panose="02010803020104030203" pitchFamily="2" charset="-79"/>
+                <a:cs typeface="Aharoni" panose="02010803020104030203" pitchFamily="2" charset="-79"/>
+              </a:endParaRPr>
+            </a:p>
+          </p:txBody>
+        </p:sp>
+        <p:sp>
+          <p:nvSpPr>
+            <p:cNvPr id="9" name="Rechteck 8"/>
+            <p:cNvSpPr/>
+            <p:nvPr/>
+          </p:nvSpPr>
+          <p:spPr>
+            <a:xfrm>
+              <a:off x="969114" y="918708"/>
+              <a:ext cx="28800" cy="520639"/>
+            </a:xfrm>
+            <a:prstGeom prst="rect">
+              <a:avLst/>
+            </a:prstGeom>
+            <a:solidFill>
+              <a:srgbClr val="0066CC"/>
+            </a:solidFill>
+            <a:ln>
+              <a:noFill/>
+            </a:ln>
+          </p:spPr>
+          <p:style>
+            <a:lnRef idx="2">
+              <a:schemeClr val="accent1">
+                <a:shade val="50000"/>
+              </a:schemeClr>
+            </a:lnRef>
+            <a:fillRef idx="1">
+              <a:schemeClr val="accent1"/>
+            </a:fillRef>
+            <a:effectRef idx="0">
+              <a:schemeClr val="accent1"/>
+            </a:effectRef>
+            <a:fontRef idx="minor">
+              <a:schemeClr val="lt1"/>
+            </a:fontRef>
+          </p:style>
+          <p:txBody>
+            <a:bodyPr rtlCol="0" anchor="ctr"/>
+            <a:lstStyle/>
+            <a:p>
+              <a:pPr algn="ctr"/>
+              <a:endParaRPr lang="en-US"/>
+            </a:p>
+          </p:txBody>
+        </p:sp>
+        <p:sp>
+          <p:nvSpPr>
+            <p:cNvPr id="11" name="Rechteck 10"/>
+            <p:cNvSpPr/>
+            <p:nvPr/>
+          </p:nvSpPr>
+          <p:spPr>
+            <a:xfrm>
+              <a:off x="1076484" y="1135641"/>
+              <a:ext cx="28800" cy="303706"/>
+            </a:xfrm>
+            <a:prstGeom prst="rect">
+              <a:avLst/>
+            </a:prstGeom>
+            <a:solidFill>
+              <a:srgbClr val="0066CC"/>
+            </a:solidFill>
+            <a:ln>
+              <a:noFill/>
+            </a:ln>
+          </p:spPr>
+          <p:style>
+            <a:lnRef idx="2">
+              <a:schemeClr val="accent1">
+                <a:shade val="50000"/>
+              </a:schemeClr>
+            </a:lnRef>
+            <a:fillRef idx="1">
+              <a:schemeClr val="accent1"/>
+            </a:fillRef>
+            <a:effectRef idx="0">
+              <a:schemeClr val="accent1"/>
+            </a:effectRef>
+            <a:fontRef idx="minor">
+              <a:schemeClr val="lt1"/>
+            </a:fontRef>
+          </p:style>
+          <p:txBody>
+            <a:bodyPr rtlCol="0" anchor="ctr"/>
+            <a:lstStyle/>
+            <a:p>
+              <a:pPr algn="ctr"/>
+              <a:endParaRPr lang="en-US"/>
+            </a:p>
+          </p:txBody>
+        </p:sp>
+        <p:sp>
+          <p:nvSpPr>
+            <p:cNvPr id="12" name="Rechteck 11"/>
+            <p:cNvSpPr/>
+            <p:nvPr/>
+          </p:nvSpPr>
+          <p:spPr>
+            <a:xfrm>
+              <a:off x="861738" y="1115347"/>
+              <a:ext cx="28800" cy="324000"/>
+            </a:xfrm>
+            <a:prstGeom prst="rect">
+              <a:avLst/>
+            </a:prstGeom>
+            <a:solidFill>
+              <a:srgbClr val="0066CC"/>
+            </a:solidFill>
+            <a:ln>
+              <a:noFill/>
+            </a:ln>
+          </p:spPr>
+          <p:style>
+            <a:lnRef idx="2">
+              <a:schemeClr val="accent1">
+                <a:shade val="50000"/>
+              </a:schemeClr>
+            </a:lnRef>
+            <a:fillRef idx="1">
+              <a:schemeClr val="accent1"/>
+            </a:fillRef>
+            <a:effectRef idx="0">
+              <a:schemeClr val="accent1"/>
+            </a:effectRef>
+            <a:fontRef idx="minor">
+              <a:schemeClr val="lt1"/>
+            </a:fontRef>
+          </p:style>
+          <p:txBody>
+            <a:bodyPr rtlCol="0" anchor="ctr"/>
+            <a:lstStyle/>
+            <a:p>
+              <a:pPr algn="ctr"/>
+              <a:endParaRPr lang="en-US"/>
+            </a:p>
+          </p:txBody>
+        </p:sp>
+        <p:sp>
+          <p:nvSpPr>
+            <p:cNvPr id="13" name="Rechteck 12"/>
+            <p:cNvSpPr/>
+            <p:nvPr/>
+          </p:nvSpPr>
+          <p:spPr>
+            <a:xfrm>
+              <a:off x="914236" y="1005481"/>
+              <a:ext cx="28800" cy="433866"/>
+            </a:xfrm>
+            <a:prstGeom prst="rect">
+              <a:avLst/>
+            </a:prstGeom>
+            <a:solidFill>
+              <a:srgbClr val="0066CC"/>
+            </a:solidFill>
+            <a:ln>
+              <a:noFill/>
+            </a:ln>
+          </p:spPr>
+          <p:style>
+            <a:lnRef idx="2">
+              <a:schemeClr val="accent1">
+                <a:shade val="50000"/>
+              </a:schemeClr>
+            </a:lnRef>
+            <a:fillRef idx="1">
+              <a:schemeClr val="accent1"/>
+            </a:fillRef>
+            <a:effectRef idx="0">
+              <a:schemeClr val="accent1"/>
+            </a:effectRef>
+            <a:fontRef idx="minor">
+              <a:schemeClr val="lt1"/>
+            </a:fontRef>
+          </p:style>
+          <p:txBody>
+            <a:bodyPr rtlCol="0" anchor="ctr"/>
+            <a:lstStyle/>
+            <a:p>
+              <a:pPr algn="ctr"/>
+              <a:endParaRPr lang="en-US"/>
+            </a:p>
+          </p:txBody>
+        </p:sp>
+        <p:sp>
+          <p:nvSpPr>
+            <p:cNvPr id="14" name="Rechteck 13"/>
+            <p:cNvSpPr/>
+            <p:nvPr/>
+          </p:nvSpPr>
+          <p:spPr>
+            <a:xfrm>
+              <a:off x="1021606" y="1048868"/>
+              <a:ext cx="28800" cy="390479"/>
+            </a:xfrm>
+            <a:prstGeom prst="rect">
+              <a:avLst/>
+            </a:prstGeom>
+            <a:solidFill>
+              <a:srgbClr val="0066CC"/>
+            </a:solidFill>
+            <a:ln>
+              <a:noFill/>
+            </a:ln>
+          </p:spPr>
+          <p:style>
+            <a:lnRef idx="2">
+              <a:schemeClr val="accent1">
+                <a:shade val="50000"/>
+              </a:schemeClr>
+            </a:lnRef>
+            <a:fillRef idx="1">
+              <a:schemeClr val="accent1"/>
+            </a:fillRef>
+            <a:effectRef idx="0">
+              <a:schemeClr val="accent1"/>
+            </a:effectRef>
+            <a:fontRef idx="minor">
+              <a:schemeClr val="lt1"/>
+            </a:fontRef>
+          </p:style>
+          <p:txBody>
+            <a:bodyPr rtlCol="0" anchor="ctr"/>
+            <a:lstStyle/>
+            <a:p>
+              <a:pPr algn="ctr"/>
+              <a:endParaRPr lang="en-US"/>
+            </a:p>
+          </p:txBody>
+        </p:sp>
+        <p:sp>
+          <p:nvSpPr>
+            <p:cNvPr id="21" name="Rechteck 20"/>
+            <p:cNvSpPr/>
+            <p:nvPr/>
+          </p:nvSpPr>
+          <p:spPr>
+            <a:xfrm>
+              <a:off x="1131363" y="1259347"/>
+              <a:ext cx="28800" cy="180000"/>
+            </a:xfrm>
+            <a:prstGeom prst="rect">
+              <a:avLst/>
+            </a:prstGeom>
+            <a:solidFill>
+              <a:srgbClr val="0066CC"/>
+            </a:solidFill>
+            <a:ln>
+              <a:noFill/>
+            </a:ln>
+          </p:spPr>
+          <p:style>
+            <a:lnRef idx="2">
+              <a:schemeClr val="accent1">
+                <a:shade val="50000"/>
+              </a:schemeClr>
+            </a:lnRef>
+            <a:fillRef idx="1">
+              <a:schemeClr val="accent1"/>
+            </a:fillRef>
+            <a:effectRef idx="0">
+              <a:schemeClr val="accent1"/>
+            </a:effectRef>
+            <a:fontRef idx="minor">
+              <a:schemeClr val="lt1"/>
+            </a:fontRef>
+          </p:style>
+          <p:txBody>
+            <a:bodyPr rtlCol="0" anchor="ctr"/>
+            <a:lstStyle/>
+            <a:p>
+              <a:pPr algn="ctr"/>
+              <a:endParaRPr lang="en-US"/>
+            </a:p>
+          </p:txBody>
+        </p:sp>
+        <p:sp>
+          <p:nvSpPr>
+            <p:cNvPr id="25" name="Rechteck 24"/>
+            <p:cNvSpPr/>
+            <p:nvPr/>
+          </p:nvSpPr>
+          <p:spPr>
+            <a:xfrm>
+              <a:off x="809115" y="1295347"/>
+              <a:ext cx="28800" cy="144000"/>
+            </a:xfrm>
+            <a:prstGeom prst="rect">
+              <a:avLst/>
+            </a:prstGeom>
+            <a:solidFill>
+              <a:srgbClr val="0066CC"/>
+            </a:solidFill>
+            <a:ln>
+              <a:noFill/>
+            </a:ln>
+          </p:spPr>
+          <p:style>
+            <a:lnRef idx="2">
+              <a:schemeClr val="accent1">
+                <a:shade val="50000"/>
+              </a:schemeClr>
+            </a:lnRef>
+            <a:fillRef idx="1">
+              <a:schemeClr val="accent1"/>
+            </a:fillRef>
+            <a:effectRef idx="0">
+              <a:schemeClr val="accent1"/>
+            </a:effectRef>
+            <a:fontRef idx="minor">
+              <a:schemeClr val="lt1"/>
+            </a:fontRef>
+          </p:style>
+          <p:txBody>
+            <a:bodyPr rtlCol="0" anchor="ctr"/>
+            <a:lstStyle/>
+            <a:p>
+              <a:pPr algn="ctr"/>
+              <a:endParaRPr lang="en-US"/>
+            </a:p>
+          </p:txBody>
+        </p:sp>
+        <p:cxnSp>
+          <p:nvCxnSpPr>
+            <p:cNvPr id="7" name="Gerader Verbinder 6"/>
+            <p:cNvCxnSpPr/>
+            <p:nvPr/>
+          </p:nvCxnSpPr>
+          <p:spPr>
+            <a:xfrm>
+              <a:off x="775774" y="1485900"/>
+              <a:ext cx="3469678" cy="0"/>
+            </a:xfrm>
+            <a:prstGeom prst="line">
+              <a:avLst/>
+            </a:prstGeom>
+            <a:ln w="22225">
+              <a:solidFill>
+                <a:srgbClr val="0066CC"/>
+              </a:solidFill>
+            </a:ln>
+          </p:spPr>
+          <p:style>
+            <a:lnRef idx="1">
+              <a:schemeClr val="accent1"/>
+            </a:lnRef>
+            <a:fillRef idx="0">
+              <a:schemeClr val="accent1"/>
+            </a:fillRef>
+            <a:effectRef idx="0">
+              <a:schemeClr val="accent1"/>
+            </a:effectRef>
+            <a:fontRef idx="minor">
+              <a:schemeClr val="tx1"/>
+            </a:fontRef>
+          </p:style>
+        </p:cxnSp>
+        <p:sp>
+          <p:nvSpPr>
+            <p:cNvPr id="22" name="Rechteck 21"/>
+            <p:cNvSpPr/>
+            <p:nvPr/>
+          </p:nvSpPr>
+          <p:spPr>
+            <a:xfrm>
+              <a:off x="1186242" y="1367347"/>
+              <a:ext cx="28800" cy="72000"/>
+            </a:xfrm>
+            <a:prstGeom prst="rect">
+              <a:avLst/>
+            </a:prstGeom>
+            <a:solidFill>
+              <a:srgbClr val="0066CC"/>
+            </a:solidFill>
+            <a:ln>
+              <a:noFill/>
+            </a:ln>
+          </p:spPr>
+          <p:style>
+            <a:lnRef idx="2">
+              <a:schemeClr val="accent1">
+                <a:shade val="50000"/>
+              </a:schemeClr>
+            </a:lnRef>
+            <a:fillRef idx="1">
+              <a:schemeClr val="accent1"/>
+            </a:fillRef>
+            <a:effectRef idx="0">
+              <a:schemeClr val="accent1"/>
+            </a:effectRef>
+            <a:fontRef idx="minor">
+              <a:schemeClr val="lt1"/>
+            </a:fontRef>
+          </p:style>
+          <p:txBody>
+            <a:bodyPr rtlCol="0" anchor="ctr"/>
+            <a:lstStyle/>
+            <a:p>
+              <a:pPr algn="ctr"/>
+              <a:endParaRPr lang="en-US"/>
+            </a:p>
+          </p:txBody>
+        </p:sp>
+        <p:sp>
+          <p:nvSpPr>
+            <p:cNvPr id="23" name="Rechteck 22"/>
+            <p:cNvSpPr/>
+            <p:nvPr/>
+          </p:nvSpPr>
+          <p:spPr>
+            <a:xfrm>
+              <a:off x="1241121" y="1402158"/>
+              <a:ext cx="28800" cy="36000"/>
+            </a:xfrm>
+            <a:prstGeom prst="rect">
+              <a:avLst/>
+            </a:prstGeom>
+            <a:solidFill>
+              <a:srgbClr val="0066CC"/>
+            </a:solidFill>
+            <a:ln>
+              <a:noFill/>
+            </a:ln>
+          </p:spPr>
+          <p:style>
+            <a:lnRef idx="2">
+              <a:schemeClr val="accent1">
+                <a:shade val="50000"/>
+              </a:schemeClr>
+            </a:lnRef>
+            <a:fillRef idx="1">
+              <a:schemeClr val="accent1"/>
+            </a:fillRef>
+            <a:effectRef idx="0">
+              <a:schemeClr val="accent1"/>
+            </a:effectRef>
+            <a:fontRef idx="minor">
+              <a:schemeClr val="lt1"/>
+            </a:fontRef>
+          </p:style>
+          <p:txBody>
+            <a:bodyPr rtlCol="0" anchor="ctr"/>
+            <a:lstStyle/>
+            <a:p>
+              <a:pPr algn="ctr"/>
+              <a:endParaRPr lang="en-US"/>
+            </a:p>
+          </p:txBody>
+        </p:sp>
+        <mc:AlternateContent xmlns:mc="http://schemas.openxmlformats.org/markup-compatibility/2006" xmlns:a14="http://schemas.microsoft.com/office/drawing/2010/main">
+          <mc:Choice Requires="a14">
+            <p:sp>
+              <p:nvSpPr>
+                <p:cNvPr id="15" name="Textfeld 14"/>
+                <p:cNvSpPr txBox="1"/>
+                <p:nvPr/>
+              </p:nvSpPr>
+              <p:spPr>
+                <a:xfrm>
+                  <a:off x="4245452" y="617981"/>
+                  <a:ext cx="339837" cy="430887"/>
+                </a:xfrm>
+                <a:prstGeom prst="rect">
+                  <a:avLst/>
+                </a:prstGeom>
+                <a:noFill/>
+              </p:spPr>
+              <p:txBody>
+                <a:bodyPr wrap="none" lIns="0" tIns="0" rIns="0" bIns="0" rtlCol="0">
+                  <a:spAutoFit/>
+                </a:bodyPr>
+                <a:lstStyle/>
+                <a:p>
+                  <a:pPr/>
+                  <a14:m>
+                    <m:oMathPara xmlns:m="http://schemas.openxmlformats.org/officeDocument/2006/math">
+                      <m:oMathParaPr>
+                        <m:jc m:val="centerGroup"/>
+                      </m:oMathParaPr>
+                      <m:oMath xmlns:m="http://schemas.openxmlformats.org/officeDocument/2006/math">
+                        <m:r>
+                          <a:rPr lang="en-US" sz="2800" i="1" smtClean="0">
+                            <a:solidFill>
+                              <a:srgbClr val="0066CC"/>
+                            </a:solidFill>
+                            <a:latin typeface="Cambria Math" panose="02040503050406030204" pitchFamily="18" charset="0"/>
+                            <a:ea typeface="Cambria Math" panose="02040503050406030204" pitchFamily="18" charset="0"/>
+                          </a:rPr>
+                          <m:t>⊨</m:t>
+                        </m:r>
+                      </m:oMath>
+                    </m:oMathPara>
+                  </a14:m>
+                  <a:endParaRPr lang="en-US" sz="2800">
+                    <a:solidFill>
+                      <a:srgbClr val="0066CC"/>
+                    </a:solidFill>
+                  </a:endParaRPr>
+                </a:p>
+              </p:txBody>
+            </p:sp>
+          </mc:Choice>
+          <mc:Fallback xmlns="">
+            <p:sp>
+              <p:nvSpPr>
+                <p:cNvPr id="15" name="Textfeld 14"/>
+                <p:cNvSpPr txBox="1">
+                  <a:spLocks noRot="1" noChangeAspect="1" noMove="1" noResize="1" noEditPoints="1" noAdjustHandles="1" noChangeArrowheads="1" noChangeShapeType="1" noTextEdit="1"/>
+                </p:cNvSpPr>
+                <p:nvPr/>
+              </p:nvSpPr>
+              <p:spPr>
+                <a:xfrm>
+                  <a:off x="4245452" y="617981"/>
+                  <a:ext cx="339837" cy="430887"/>
+                </a:xfrm>
+                <a:prstGeom prst="rect">
+                  <a:avLst/>
+                </a:prstGeom>
+                <a:blipFill rotWithShape="0">
+                  <a:blip r:embed="rId2"/>
+                  <a:stretch>
+                    <a:fillRect/>
+                  </a:stretch>
+                </a:blipFill>
+              </p:spPr>
+              <p:txBody>
+                <a:bodyPr/>
+                <a:lstStyle/>
+                <a:p>
+                  <a:r>
+                    <a:rPr lang="en-US">
+                      <a:noFill/>
+                    </a:rPr>
+                    <a:t> </a:t>
+                  </a:r>
+                </a:p>
+              </p:txBody>
+            </p:sp>
+          </mc:Fallback>
+        </mc:AlternateContent>
+      </p:grpSp>
+    </p:spTree>
+    <p:extLst>
+      <p:ext uri="{BB962C8B-B14F-4D97-AF65-F5344CB8AC3E}">
+        <p14:creationId xmlns:p14="http://schemas.microsoft.com/office/powerpoint/2010/main" val="942057784"/>
       </p:ext>
     </p:extLst>
   </p:cSld>

</xml_diff>